<commit_message>
Fixed 'mancanze' in intro slides
</commit_message>
<xml_diff>
--- a/MentOS - Introduzione.pptx
+++ b/MentOS - Introduzione.pptx
@@ -133,6 +133,7 @@
 <p1510:revInfo xmlns:a="http://schemas.openxmlformats.org/drawingml/2006/main" xmlns:r="http://schemas.openxmlformats.org/officeDocument/2006/relationships" xmlns:p1510="http://schemas.microsoft.com/office/powerpoint/2015/10/main">
   <p1510:revLst>
     <p1510:client id="{007F0052-D830-4956-BA51-9334826F1F64}" v="3" dt="2023-08-20T16:05:36.923"/>
+    <p1510:client id="{4C54F9EB-1983-4E42-BA90-9A873F83A8B8}" v="179" dt="2023-08-24T20:23:25.139"/>
     <p1510:client id="{C34BCE00-AF43-4556-85D1-277DD52998D2}" v="4" dt="2023-08-21T18:14:37.631"/>
     <p1510:client id="{F454780C-B1ED-42C0-86DB-50F9F77A1214}" v="967" dt="2023-08-20T16:00:38.027"/>
   </p1510:revLst>
@@ -3419,7 +3420,7 @@
           <a:p>
             <a:fld id="{52A8C91D-1C30-49A1-B6C0-B2A9BC12C44C}" type="datetimeFigureOut">
               <a:rPr lang="it-IT" smtClean="0"/>
-              <a:t>21/08/2023</a:t>
+              <a:t>24/08/2023</a:t>
             </a:fld>
             <a:endParaRPr lang="it-IT"/>
           </a:p>
@@ -3597,7 +3598,7 @@
           <a:p>
             <a:fld id="{7CFB70B6-FB36-47A1-936C-90CB98895F23}" type="datetimeFigureOut">
               <a:rPr lang="it-IT" noProof="0" smtClean="0"/>
-              <a:t>21/08/2023</a:t>
+              <a:t>24/08/2023</a:t>
             </a:fld>
             <a:endParaRPr lang="it-IT" noProof="0"/>
           </a:p>
@@ -4277,7 +4278,7 @@
             <a:fld id="{B61BEF0D-F0BB-DE4B-95CE-6DB70DBA9567}" type="datetimeFigureOut">
               <a:rPr lang="en-US" dirty="0"/>
               <a:pPr/>
-              <a:t>8/21/2023</a:t>
+              <a:t>8/24/2023</a:t>
             </a:fld>
             <a:endParaRPr lang="en-US" dirty="0"/>
           </a:p>
@@ -4539,7 +4540,7 @@
             <a:fld id="{B61BEF0D-F0BB-DE4B-95CE-6DB70DBA9567}" type="datetimeFigureOut">
               <a:rPr lang="en-US" dirty="0"/>
               <a:pPr/>
-              <a:t>8/21/2023</a:t>
+              <a:t>8/24/2023</a:t>
             </a:fld>
             <a:endParaRPr lang="en-US" dirty="0"/>
           </a:p>
@@ -4774,7 +4775,7 @@
             <a:fld id="{B61BEF0D-F0BB-DE4B-95CE-6DB70DBA9567}" type="datetimeFigureOut">
               <a:rPr lang="en-US" dirty="0"/>
               <a:pPr/>
-              <a:t>8/21/2023</a:t>
+              <a:t>8/24/2023</a:t>
             </a:fld>
             <a:endParaRPr lang="en-US" dirty="0"/>
           </a:p>
@@ -5014,7 +5015,7 @@
             <a:fld id="{B61BEF0D-F0BB-DE4B-95CE-6DB70DBA9567}" type="datetimeFigureOut">
               <a:rPr lang="en-US" dirty="0"/>
               <a:pPr/>
-              <a:t>8/21/2023</a:t>
+              <a:t>8/24/2023</a:t>
             </a:fld>
             <a:endParaRPr lang="en-US" dirty="0"/>
           </a:p>
@@ -5322,7 +5323,7 @@
             <a:fld id="{B61BEF0D-F0BB-DE4B-95CE-6DB70DBA9567}" type="datetimeFigureOut">
               <a:rPr lang="en-US" dirty="0"/>
               <a:pPr/>
-              <a:t>8/21/2023</a:t>
+              <a:t>8/24/2023</a:t>
             </a:fld>
             <a:endParaRPr lang="en-US" dirty="0"/>
           </a:p>
@@ -5623,7 +5624,7 @@
             <a:fld id="{B61BEF0D-F0BB-DE4B-95CE-6DB70DBA9567}" type="datetimeFigureOut">
               <a:rPr lang="en-US" dirty="0"/>
               <a:pPr/>
-              <a:t>8/21/2023</a:t>
+              <a:t>8/24/2023</a:t>
             </a:fld>
             <a:endParaRPr lang="en-US" dirty="0"/>
           </a:p>
@@ -6044,7 +6045,7 @@
             <a:fld id="{B61BEF0D-F0BB-DE4B-95CE-6DB70DBA9567}" type="datetimeFigureOut">
               <a:rPr lang="en-US" dirty="0"/>
               <a:pPr/>
-              <a:t>8/21/2023</a:t>
+              <a:t>8/24/2023</a:t>
             </a:fld>
             <a:endParaRPr lang="en-US" dirty="0"/>
           </a:p>
@@ -6207,7 +6208,7 @@
             <a:fld id="{B61BEF0D-F0BB-DE4B-95CE-6DB70DBA9567}" type="datetimeFigureOut">
               <a:rPr lang="en-US" dirty="0"/>
               <a:pPr/>
-              <a:t>8/21/2023</a:t>
+              <a:t>8/24/2023</a:t>
             </a:fld>
             <a:endParaRPr lang="en-US" dirty="0"/>
           </a:p>
@@ -6304,7 +6305,7 @@
             <a:fld id="{B61BEF0D-F0BB-DE4B-95CE-6DB70DBA9567}" type="datetimeFigureOut">
               <a:rPr lang="en-US" dirty="0"/>
               <a:pPr/>
-              <a:t>8/21/2023</a:t>
+              <a:t>8/24/2023</a:t>
             </a:fld>
             <a:endParaRPr lang="en-US" dirty="0"/>
           </a:p>
@@ -6682,7 +6683,7 @@
             <a:fld id="{B61BEF0D-F0BB-DE4B-95CE-6DB70DBA9567}" type="datetimeFigureOut">
               <a:rPr lang="en-US" dirty="0"/>
               <a:pPr/>
-              <a:t>8/21/2023</a:t>
+              <a:t>8/24/2023</a:t>
             </a:fld>
             <a:endParaRPr lang="en-US" dirty="0"/>
           </a:p>
@@ -6968,7 +6969,7 @@
             <a:fld id="{B61BEF0D-F0BB-DE4B-95CE-6DB70DBA9567}" type="datetimeFigureOut">
               <a:rPr lang="en-US" dirty="0"/>
               <a:pPr/>
-              <a:t>8/21/2023</a:t>
+              <a:t>8/24/2023</a:t>
             </a:fld>
             <a:endParaRPr lang="en-US" dirty="0"/>
           </a:p>
@@ -7207,7 +7208,7 @@
             <a:fld id="{B61BEF0D-F0BB-DE4B-95CE-6DB70DBA9567}" type="datetimeFigureOut">
               <a:rPr lang="en-US" dirty="0"/>
               <a:pPr/>
-              <a:t>8/21/2023</a:t>
+              <a:t>8/24/2023</a:t>
             </a:fld>
             <a:endParaRPr lang="en-US" dirty="0"/>
           </a:p>
@@ -9626,61 +9627,9 @@
                 <a:ea typeface="+mn-lt"/>
                 <a:cs typeface="+mn-lt"/>
               </a:rPr>
-              <a:t> è attualmente pensato per sistemi single core, ed è quindi privo di funzionalità multicore.</a:t>
+              <a:t> è attualmente pensato per sistemi single core ed è quindi privo di funzionalità multicore.</a:t>
             </a:r>
             <a:endParaRPr lang="it-IT" dirty="0"/>
-          </a:p>
-          <a:p>
-            <a:pPr marL="305435" indent="-305435"/>
-            <a:r>
-              <a:rPr lang="it-IT" dirty="0">
-                <a:ea typeface="+mn-lt"/>
-                <a:cs typeface="+mn-lt"/>
-              </a:rPr>
-              <a:t>È da notare come i meccanismi di sincronizzazione presenti di base in </a:t>
-            </a:r>
-            <a:r>
-              <a:rPr lang="it-IT" dirty="0" err="1">
-                <a:ea typeface="+mn-lt"/>
-                <a:cs typeface="+mn-lt"/>
-              </a:rPr>
-              <a:t>MentOS</a:t>
-            </a:r>
-            <a:r>
-              <a:rPr lang="it-IT" dirty="0">
-                <a:ea typeface="+mn-lt"/>
-                <a:cs typeface="+mn-lt"/>
-              </a:rPr>
-              <a:t> siano ridotti all'osso, essendo presenti solo </a:t>
-            </a:r>
-            <a:r>
-              <a:rPr lang="it-IT" dirty="0" err="1">
-                <a:ea typeface="+mn-lt"/>
-                <a:cs typeface="+mn-lt"/>
-              </a:rPr>
-              <a:t>spinlock</a:t>
-            </a:r>
-            <a:r>
-              <a:rPr lang="it-IT" dirty="0">
-                <a:ea typeface="+mn-lt"/>
-                <a:cs typeface="+mn-lt"/>
-              </a:rPr>
-              <a:t> e </a:t>
-            </a:r>
-            <a:r>
-              <a:rPr lang="it-IT" dirty="0" err="1">
-                <a:ea typeface="+mn-lt"/>
-                <a:cs typeface="+mn-lt"/>
-              </a:rPr>
-              <a:t>mutex</a:t>
-            </a:r>
-            <a:r>
-              <a:rPr lang="it-IT" dirty="0">
-                <a:ea typeface="+mn-lt"/>
-                <a:cs typeface="+mn-lt"/>
-              </a:rPr>
-              <a:t>, e questi ultimi solo abbozzati (si veda le slide relative alla sincronizzazione per la seconda parte del progetto).</a:t>
-            </a:r>
           </a:p>
           <a:p>
             <a:pPr marL="305435" indent="-305435"/>
@@ -9706,8 +9655,81 @@
             </a:r>
             <a:r>
               <a:rPr lang="it-IT" dirty="0"/>
-              <a:t>ma non la loro implementazione</a:t>
-            </a:r>
+              <a:t>ma non la loro implementazione. Tra queste funzionalità "accennate" abbiamo:</a:t>
+            </a:r>
+          </a:p>
+          <a:p>
+            <a:pPr marL="629920" lvl="1" indent="-305435"/>
+            <a:r>
+              <a:rPr lang="it-IT" dirty="0"/>
+              <a:t>L'allocazione della memoria (l'algoritmo </a:t>
+            </a:r>
+            <a:r>
+              <a:rPr lang="it-IT" dirty="0" err="1"/>
+              <a:t>buddy</a:t>
+            </a:r>
+            <a:r>
+              <a:rPr lang="it-IT" dirty="0"/>
+              <a:t> system non è effettivamente implementato nel codice del kernel)</a:t>
+            </a:r>
+          </a:p>
+          <a:p>
+            <a:pPr marL="629920" lvl="1" indent="-305435"/>
+            <a:r>
+              <a:rPr lang="it-IT" dirty="0"/>
+              <a:t>Gli algoritmi di scheduling (l'unico ad essere effettivamente presente è il round </a:t>
+            </a:r>
+            <a:r>
+              <a:rPr lang="it-IT" dirty="0" err="1"/>
+              <a:t>robin</a:t>
+            </a:r>
+            <a:r>
+              <a:rPr lang="it-IT" dirty="0"/>
+              <a:t>)</a:t>
+            </a:r>
+          </a:p>
+          <a:p>
+            <a:pPr marL="629920" lvl="1" indent="-305435"/>
+            <a:r>
+              <a:rPr lang="it-IT" dirty="0"/>
+              <a:t>La sincronizzazione (sono presenti solo </a:t>
+            </a:r>
+            <a:r>
+              <a:rPr lang="it-IT" dirty="0" err="1"/>
+              <a:t>mutex</a:t>
+            </a:r>
+            <a:r>
+              <a:rPr lang="it-IT" dirty="0"/>
+              <a:t>, </a:t>
+            </a:r>
+            <a:r>
+              <a:rPr lang="it-IT" dirty="0" err="1"/>
+              <a:t>spinlock</a:t>
+            </a:r>
+            <a:r>
+              <a:rPr lang="it-IT" dirty="0"/>
+              <a:t> e </a:t>
+            </a:r>
+            <a:r>
+              <a:rPr lang="it-IT" dirty="0" err="1"/>
+              <a:t>wait</a:t>
+            </a:r>
+            <a:r>
+              <a:rPr lang="it-IT" dirty="0"/>
+              <a:t> </a:t>
+            </a:r>
+            <a:r>
+              <a:rPr lang="it-IT" dirty="0" err="1"/>
+              <a:t>queue</a:t>
+            </a:r>
+            <a:r>
+              <a:rPr lang="it-IT" dirty="0"/>
+              <a:t>)</a:t>
+            </a:r>
+          </a:p>
+          <a:p>
+            <a:pPr marL="629920" lvl="1" indent="-305435"/>
+            <a:endParaRPr lang="it-IT" dirty="0"/>
           </a:p>
         </p:txBody>
       </p:sp>

</xml_diff>